<commit_message>
Updating read_data so it can work with downloaded data defaults
</commit_message>
<xml_diff>
--- a/extras/presentations/pnnl_nasa_lcluc_task_4.pptx
+++ b/extras/presentations/pnnl_nasa_lcluc_task_4.pptx
@@ -5,17 +5,18 @@
     <p:sldMasterId id="2147483723" r:id="rId4"/>
   </p:sldMasterIdLst>
   <p:notesMasterIdLst>
-    <p:notesMasterId r:id="rId10"/>
+    <p:notesMasterId r:id="rId11"/>
   </p:notesMasterIdLst>
   <p:handoutMasterIdLst>
-    <p:handoutMasterId r:id="rId11"/>
+    <p:handoutMasterId r:id="rId12"/>
   </p:handoutMasterIdLst>
   <p:sldIdLst>
     <p:sldId id="260" r:id="rId5"/>
     <p:sldId id="269" r:id="rId6"/>
-    <p:sldId id="270" r:id="rId7"/>
-    <p:sldId id="271" r:id="rId8"/>
-    <p:sldId id="268" r:id="rId9"/>
+    <p:sldId id="272" r:id="rId7"/>
+    <p:sldId id="270" r:id="rId8"/>
+    <p:sldId id="271" r:id="rId9"/>
+    <p:sldId id="268" r:id="rId10"/>
   </p:sldIdLst>
   <p:sldSz cx="14630400" cy="8229600"/>
   <p:notesSz cx="6858000" cy="9144000"/>
@@ -233,7 +234,7 @@
           <a:p>
             <a:fld id="{C06E50B8-2EF8-564F-AE86-D84E6C503530}" type="datetimeFigureOut">
               <a:rPr lang="en-US" smtClean="0"/>
-              <a:t>6/23/2023</a:t>
+              <a:t>7/13/2023</a:t>
             </a:fld>
             <a:endParaRPr lang="en-US"/>
           </a:p>
@@ -410,7 +411,7 @@
           <a:p>
             <a:fld id="{13AC8D20-1945-7145-91A2-3D134BDA25E2}" type="datetimeFigureOut">
               <a:rPr lang="en-US" smtClean="0"/>
-              <a:t>6/23/2023</a:t>
+              <a:t>7/13/2023</a:t>
             </a:fld>
             <a:endParaRPr lang="en-US"/>
           </a:p>
@@ -1219,7 +1220,7 @@
           <a:p>
             <a:fld id="{ABD4F8E3-4ED9-44B4-99E6-8A3D2CF8D415}" type="datetime4">
               <a:rPr lang="en-US" smtClean="0"/>
-              <a:t>June 23, 2023</a:t>
+              <a:t>July 13, 2023</a:t>
             </a:fld>
             <a:endParaRPr lang="en-US"/>
           </a:p>
@@ -1899,7 +1900,7 @@
             <a:fld id="{9B7EE7B1-A6C1-4E39-8665-A73ED03F32E1}" type="datetimeFigureOut">
               <a:rPr lang="en-US" smtClean="0"/>
               <a:pPr/>
-              <a:t>6/23/2023</a:t>
+              <a:t>7/13/2023</a:t>
             </a:fld>
             <a:endParaRPr lang="en-US"/>
           </a:p>
@@ -2322,7 +2323,7 @@
             <a:fld id="{9B7EE7B1-A6C1-4E39-8665-A73ED03F32E1}" type="datetimeFigureOut">
               <a:rPr lang="en-US" smtClean="0"/>
               <a:pPr/>
-              <a:t>6/23/2023</a:t>
+              <a:t>7/13/2023</a:t>
             </a:fld>
             <a:endParaRPr lang="en-US"/>
           </a:p>
@@ -2746,7 +2747,7 @@
             <a:fld id="{9B7EE7B1-A6C1-4E39-8665-A73ED03F32E1}" type="datetimeFigureOut">
               <a:rPr lang="en-US" smtClean="0"/>
               <a:pPr/>
-              <a:t>6/23/2023</a:t>
+              <a:t>7/13/2023</a:t>
             </a:fld>
             <a:endParaRPr lang="en-US"/>
           </a:p>
@@ -3123,7 +3124,7 @@
             <a:fld id="{9B7EE7B1-A6C1-4E39-8665-A73ED03F32E1}" type="datetimeFigureOut">
               <a:rPr lang="en-US" smtClean="0"/>
               <a:pPr/>
-              <a:t>6/23/2023</a:t>
+              <a:t>7/13/2023</a:t>
             </a:fld>
             <a:endParaRPr lang="en-US"/>
           </a:p>
@@ -4047,7 +4048,7 @@
             <a:fld id="{9B7EE7B1-A6C1-4E39-8665-A73ED03F32E1}" type="datetimeFigureOut">
               <a:rPr lang="en-US" smtClean="0"/>
               <a:pPr/>
-              <a:t>6/23/2023</a:t>
+              <a:t>7/13/2023</a:t>
             </a:fld>
             <a:endParaRPr lang="en-US"/>
           </a:p>
@@ -5162,7 +5163,7 @@
             <a:fld id="{9B7EE7B1-A6C1-4E39-8665-A73ED03F32E1}" type="datetimeFigureOut">
               <a:rPr lang="en-US" smtClean="0"/>
               <a:pPr/>
-              <a:t>6/23/2023</a:t>
+              <a:t>7/13/2023</a:t>
             </a:fld>
             <a:endParaRPr lang="en-US"/>
           </a:p>
@@ -6304,7 +6305,7 @@
             <a:fld id="{9B7EE7B1-A6C1-4E39-8665-A73ED03F32E1}" type="datetimeFigureOut">
               <a:rPr lang="en-US" smtClean="0"/>
               <a:pPr/>
-              <a:t>6/23/2023</a:t>
+              <a:t>7/13/2023</a:t>
             </a:fld>
             <a:endParaRPr lang="en-US"/>
           </a:p>
@@ -6579,7 +6580,7 @@
             <a:fld id="{9B7EE7B1-A6C1-4E39-8665-A73ED03F32E1}" type="datetimeFigureOut">
               <a:rPr lang="en-US" smtClean="0"/>
               <a:pPr/>
-              <a:t>6/23/2023</a:t>
+              <a:t>7/13/2023</a:t>
             </a:fld>
             <a:endParaRPr lang="en-US"/>
           </a:p>
@@ -7159,7 +7160,12 @@
             <p:ph type="ctrTitle"/>
           </p:nvPr>
         </p:nvSpPr>
-        <p:spPr/>
+        <p:spPr>
+          <a:xfrm>
+            <a:off x="1370529" y="3389976"/>
+            <a:ext cx="4572000" cy="1828800"/>
+          </a:xfrm>
+        </p:spPr>
         <p:txBody>
           <a:bodyPr/>
           <a:lstStyle/>
@@ -7169,7 +7175,20 @@
                 <a:latin typeface="Arial"/>
                 <a:cs typeface="Arial"/>
               </a:rPr>
-              <a:t>Assessing UHI impacts in Western North Africa – Task 4</a:t>
+              <a:t>Assessing UHI impacts in Western North Africa</a:t>
+            </a:r>
+            <a:br>
+              <a:rPr lang="en-US" sz="4000" dirty="0">
+                <a:latin typeface="Arial"/>
+                <a:cs typeface="Arial"/>
+              </a:rPr>
+            </a:br>
+            <a:r>
+              <a:rPr lang="en-US" sz="4000" dirty="0">
+                <a:latin typeface="Arial"/>
+                <a:cs typeface="Arial"/>
+              </a:rPr>
+              <a:t>Task 4 – Building Energy Demand</a:t>
             </a:r>
           </a:p>
         </p:txBody>
@@ -7192,7 +7211,7 @@
         </p:nvSpPr>
         <p:spPr>
           <a:xfrm>
-            <a:off x="1370529" y="5475642"/>
+            <a:off x="1370529" y="6194099"/>
             <a:ext cx="4572000" cy="274320"/>
           </a:xfrm>
         </p:spPr>
@@ -7230,7 +7249,7 @@
         </p:nvSpPr>
         <p:spPr>
           <a:xfrm>
-            <a:off x="1370529" y="5871809"/>
+            <a:off x="1370529" y="6590266"/>
             <a:ext cx="4572000" cy="274320"/>
           </a:xfrm>
         </p:spPr>
@@ -7261,7 +7280,12 @@
             <p:ph type="dt" sz="half" idx="2"/>
           </p:nvPr>
         </p:nvSpPr>
-        <p:spPr/>
+        <p:spPr>
+          <a:xfrm>
+            <a:off x="2651641" y="5634102"/>
+            <a:ext cx="3290888" cy="438150"/>
+          </a:xfrm>
+        </p:spPr>
         <p:txBody>
           <a:bodyPr/>
           <a:lstStyle/>
@@ -7523,7 +7547,7 @@
           <p:cNvPr id="2" name="Slide Number Placeholder 1">
             <a:extLst>
               <a:ext uri="{FF2B5EF4-FFF2-40B4-BE49-F238E27FC236}">
-                <a16:creationId xmlns:a16="http://schemas.microsoft.com/office/drawing/2014/main" id="{315DA470-EE99-7B9D-14CB-47D23144A70F}"/>
+                <a16:creationId xmlns:a16="http://schemas.microsoft.com/office/drawing/2014/main" id="{B50126A9-D392-F3EC-D55D-9D428B712A20}"/>
               </a:ext>
             </a:extLst>
           </p:cNvPr>
@@ -7553,7 +7577,7 @@
           <p:cNvPr id="3" name="Title 2">
             <a:extLst>
               <a:ext uri="{FF2B5EF4-FFF2-40B4-BE49-F238E27FC236}">
-                <a16:creationId xmlns:a16="http://schemas.microsoft.com/office/drawing/2014/main" id="{03579298-52D9-06D9-B202-A007B27E78E1}"/>
+                <a16:creationId xmlns:a16="http://schemas.microsoft.com/office/drawing/2014/main" id="{E51EE51F-9A68-2340-C9F4-F1B96221239A}"/>
               </a:ext>
             </a:extLst>
           </p:cNvPr>
@@ -7571,164 +7595,61 @@
           <a:p>
             <a:r>
               <a:rPr lang="en-US" dirty="0"/>
-              <a:t>Build Energy Model (BED)</a:t>
+              <a:t>Thoughts</a:t>
             </a:r>
           </a:p>
         </p:txBody>
       </p:sp>
       <p:sp>
         <p:nvSpPr>
-          <p:cNvPr id="5" name="Content Placeholder 4">
+          <p:cNvPr id="4" name="Content Placeholder 3">
             <a:extLst>
               <a:ext uri="{FF2B5EF4-FFF2-40B4-BE49-F238E27FC236}">
-                <a16:creationId xmlns:a16="http://schemas.microsoft.com/office/drawing/2014/main" id="{D39ECA88-B557-5C01-FE92-E6708327A3B3}"/>
+                <a16:creationId xmlns:a16="http://schemas.microsoft.com/office/drawing/2014/main" id="{8B9553E7-DD7D-4013-CCD9-0BE7F0F3D74E}"/>
               </a:ext>
             </a:extLst>
           </p:cNvPr>
-          <p:cNvSpPr txBox="1">
+          <p:cNvSpPr>
             <a:spLocks noGrp="1"/>
           </p:cNvSpPr>
           <p:nvPr>
             <p:ph sz="quarter" idx="20"/>
           </p:nvPr>
         </p:nvSpPr>
-        <p:spPr>
-          <a:xfrm>
-            <a:off x="1371600" y="2077898"/>
-            <a:ext cx="4535424" cy="4475071"/>
-          </a:xfrm>
-          <a:prstGeom prst="rect">
-            <a:avLst/>
-          </a:prstGeom>
-          <a:noFill/>
-        </p:spPr>
-        <p:txBody>
-          <a:bodyPr wrap="square" rtlCol="0">
-            <a:spAutoFit/>
-          </a:bodyPr>
+        <p:spPr/>
+        <p:txBody>
+          <a:bodyPr/>
           <a:lstStyle/>
           <a:p>
-            <a:pPr marL="285750" indent="-285750">
-              <a:spcAft>
-                <a:spcPts val="1200"/>
-              </a:spcAft>
-              <a:buFont typeface="Arial" panose="020B0604020202020204" pitchFamily="34" charset="0"/>
-              <a:buChar char="•"/>
-            </a:pPr>
-            <a:r>
-              <a:rPr lang="en-US" sz="1600" dirty="0"/>
-              <a:t>Building Energy Demand (BED) model is a Python package to process high-resolution data (e.g., near-surface temperature from WRF at 1-km resolution) and estimate spatial distribution of building energy demand.</a:t>
-            </a:r>
-          </a:p>
-          <a:p>
-            <a:pPr marL="285750" indent="-285750">
-              <a:spcAft>
-                <a:spcPts val="1200"/>
-              </a:spcAft>
-              <a:buFont typeface="Arial" panose="020B0604020202020204" pitchFamily="34" charset="0"/>
-              <a:buChar char="•"/>
-            </a:pPr>
-            <a:r>
-              <a:rPr lang="en-US" sz="1600" dirty="0"/>
-              <a:t>The outputs from the BED model can be used together with outputs from a modified version of the Global Change Analysis Model - GCAM-Morocco to explore emissions, water demand, and electricity generation by different fuel types in Morocco.</a:t>
-            </a:r>
-          </a:p>
-          <a:p>
-            <a:pPr marL="285750" indent="-285750">
-              <a:spcAft>
-                <a:spcPts val="1200"/>
-              </a:spcAft>
-              <a:buFont typeface="Arial" panose="020B0604020202020204" pitchFamily="34" charset="0"/>
-              <a:buChar char="•"/>
-            </a:pPr>
-            <a:r>
-              <a:rPr lang="en-US" sz="1600" dirty="0"/>
-              <a:t>More broadly, the BED model is developed for researchers to explore the shifts of building energy demand at fine resolutions in response to environmental and socio-economic changes.</a:t>
-            </a:r>
-          </a:p>
-        </p:txBody>
-      </p:sp>
-      <p:pic>
-        <p:nvPicPr>
-          <p:cNvPr id="6" name="Picture 5">
-            <a:extLst>
-              <a:ext uri="{FF2B5EF4-FFF2-40B4-BE49-F238E27FC236}">
-                <a16:creationId xmlns:a16="http://schemas.microsoft.com/office/drawing/2014/main" id="{278B64D8-8767-3CF0-6B33-1FF3EC56A1B6}"/>
-              </a:ext>
-            </a:extLst>
-          </p:cNvPr>
-          <p:cNvPicPr>
-            <a:picLocks noChangeAspect="1"/>
-          </p:cNvPicPr>
-          <p:nvPr/>
-        </p:nvPicPr>
-        <p:blipFill>
-          <a:blip r:embed="rId2">
-            <a:extLst>
-              <a:ext uri="{28A0092B-C50C-407E-A947-70E740481C1C}">
-                <a14:useLocalDpi xmlns:a14="http://schemas.microsoft.com/office/drawing/2010/main" val="0"/>
-              </a:ext>
-            </a:extLst>
-          </a:blip>
-          <a:stretch>
-            <a:fillRect/>
-          </a:stretch>
-        </p:blipFill>
-        <p:spPr>
-          <a:xfrm>
-            <a:off x="6456422" y="1736291"/>
-            <a:ext cx="7844794" cy="5158286"/>
-          </a:xfrm>
-          <a:prstGeom prst="rect">
-            <a:avLst/>
-          </a:prstGeom>
-        </p:spPr>
-      </p:pic>
-      <p:sp>
-        <p:nvSpPr>
-          <p:cNvPr id="7" name="TextBox 6">
-            <a:extLst>
-              <a:ext uri="{FF2B5EF4-FFF2-40B4-BE49-F238E27FC236}">
-                <a16:creationId xmlns:a16="http://schemas.microsoft.com/office/drawing/2014/main" id="{859EEC50-56BE-22B3-2852-FA9823C350D5}"/>
-              </a:ext>
-            </a:extLst>
-          </p:cNvPr>
-          <p:cNvSpPr txBox="1"/>
-          <p:nvPr/>
-        </p:nvSpPr>
-        <p:spPr>
-          <a:xfrm>
-            <a:off x="9326880" y="694210"/>
-            <a:ext cx="4667416" cy="424732"/>
-          </a:xfrm>
-          <a:prstGeom prst="rect">
-            <a:avLst/>
-          </a:prstGeom>
-          <a:noFill/>
-        </p:spPr>
-        <p:txBody>
-          <a:bodyPr wrap="square">
-            <a:spAutoFit/>
-          </a:bodyPr>
-          <a:lstStyle/>
-          <a:p>
-            <a:r>
-              <a:rPr lang="en-US" dirty="0">
-                <a:hlinkClick r:id="rId3"/>
-              </a:rPr>
-              <a:t>https://github.com/JGCRI/bed</a:t>
-            </a:r>
             <a:r>
               <a:rPr lang="en-US" dirty="0"/>
-              <a:t> </a:t>
+              <a:t>Global temperature pathways</a:t>
             </a:r>
+          </a:p>
+          <a:p>
+            <a:r>
+              <a:rPr lang="en-US" dirty="0"/>
+              <a:t>UHI impact + x degrees </a:t>
+            </a:r>
+          </a:p>
+          <a:p>
+            <a:endParaRPr lang="en-US" dirty="0"/>
+          </a:p>
+          <a:p>
+            <a:r>
+              <a:rPr lang="en-US" dirty="0"/>
+              <a:t>Task 4: Uses these temp info to calculate Building Energy Demands/Elec impacts/Emissions</a:t>
+            </a:r>
+          </a:p>
+          <a:p>
+            <a:endParaRPr lang="en-US" dirty="0"/>
           </a:p>
         </p:txBody>
       </p:sp>
     </p:spTree>
     <p:extLst>
       <p:ext uri="{BB962C8B-B14F-4D97-AF65-F5344CB8AC3E}">
-        <p14:creationId xmlns:p14="http://schemas.microsoft.com/office/powerpoint/2010/main" val="1738068605"/>
+        <p14:creationId xmlns:p14="http://schemas.microsoft.com/office/powerpoint/2010/main" val="407201811"/>
       </p:ext>
     </p:extLst>
   </p:cSld>
@@ -7772,6 +7693,255 @@
           <p:cNvPr id="2" name="Slide Number Placeholder 1">
             <a:extLst>
               <a:ext uri="{FF2B5EF4-FFF2-40B4-BE49-F238E27FC236}">
+                <a16:creationId xmlns:a16="http://schemas.microsoft.com/office/drawing/2014/main" id="{315DA470-EE99-7B9D-14CB-47D23144A70F}"/>
+              </a:ext>
+            </a:extLst>
+          </p:cNvPr>
+          <p:cNvSpPr>
+            <a:spLocks noGrp="1"/>
+          </p:cNvSpPr>
+          <p:nvPr>
+            <p:ph type="sldNum" sz="quarter" idx="12"/>
+          </p:nvPr>
+        </p:nvSpPr>
+        <p:spPr/>
+        <p:txBody>
+          <a:bodyPr/>
+          <a:lstStyle/>
+          <a:p>
+            <a:fld id="{FE7A4BB3-E848-5A44-82DF-322201952CD8}" type="slidenum">
+              <a:rPr lang="en-US" smtClean="0"/>
+              <a:pPr/>
+              <a:t>4</a:t>
+            </a:fld>
+            <a:endParaRPr lang="en-US"/>
+          </a:p>
+        </p:txBody>
+      </p:sp>
+      <p:sp>
+        <p:nvSpPr>
+          <p:cNvPr id="3" name="Title 2">
+            <a:extLst>
+              <a:ext uri="{FF2B5EF4-FFF2-40B4-BE49-F238E27FC236}">
+                <a16:creationId xmlns:a16="http://schemas.microsoft.com/office/drawing/2014/main" id="{03579298-52D9-06D9-B202-A007B27E78E1}"/>
+              </a:ext>
+            </a:extLst>
+          </p:cNvPr>
+          <p:cNvSpPr>
+            <a:spLocks noGrp="1"/>
+          </p:cNvSpPr>
+          <p:nvPr>
+            <p:ph type="title"/>
+          </p:nvPr>
+        </p:nvSpPr>
+        <p:spPr/>
+        <p:txBody>
+          <a:bodyPr/>
+          <a:lstStyle/>
+          <a:p>
+            <a:r>
+              <a:rPr lang="en-US" dirty="0"/>
+              <a:t>Build Energy Model (BED)</a:t>
+            </a:r>
+          </a:p>
+        </p:txBody>
+      </p:sp>
+      <p:sp>
+        <p:nvSpPr>
+          <p:cNvPr id="5" name="Content Placeholder 4">
+            <a:extLst>
+              <a:ext uri="{FF2B5EF4-FFF2-40B4-BE49-F238E27FC236}">
+                <a16:creationId xmlns:a16="http://schemas.microsoft.com/office/drawing/2014/main" id="{D39ECA88-B557-5C01-FE92-E6708327A3B3}"/>
+              </a:ext>
+            </a:extLst>
+          </p:cNvPr>
+          <p:cNvSpPr txBox="1">
+            <a:spLocks noGrp="1"/>
+          </p:cNvSpPr>
+          <p:nvPr>
+            <p:ph sz="quarter" idx="20"/>
+          </p:nvPr>
+        </p:nvSpPr>
+        <p:spPr>
+          <a:xfrm>
+            <a:off x="1371600" y="2077898"/>
+            <a:ext cx="4535424" cy="4475071"/>
+          </a:xfrm>
+          <a:prstGeom prst="rect">
+            <a:avLst/>
+          </a:prstGeom>
+          <a:noFill/>
+        </p:spPr>
+        <p:txBody>
+          <a:bodyPr wrap="square" rtlCol="0">
+            <a:spAutoFit/>
+          </a:bodyPr>
+          <a:lstStyle/>
+          <a:p>
+            <a:pPr marL="285750" indent="-285750">
+              <a:spcAft>
+                <a:spcPts val="1200"/>
+              </a:spcAft>
+              <a:buFont typeface="Arial" panose="020B0604020202020204" pitchFamily="34" charset="0"/>
+              <a:buChar char="•"/>
+            </a:pPr>
+            <a:r>
+              <a:rPr lang="en-US" sz="1600" dirty="0"/>
+              <a:t>Building Energy Demand (BED) model is a Python package to process high-resolution data (e.g., near-surface temperature from WRF at 1-km resolution) and estimate spatial distribution of building energy demand.</a:t>
+            </a:r>
+          </a:p>
+          <a:p>
+            <a:pPr marL="285750" indent="-285750">
+              <a:spcAft>
+                <a:spcPts val="1200"/>
+              </a:spcAft>
+              <a:buFont typeface="Arial" panose="020B0604020202020204" pitchFamily="34" charset="0"/>
+              <a:buChar char="•"/>
+            </a:pPr>
+            <a:r>
+              <a:rPr lang="en-US" sz="1600" dirty="0"/>
+              <a:t>The outputs from the BED model can be used together with outputs from a modified version of the Global Change Analysis Model - GCAM-Morocco to explore emissions, water demand, and electricity generation by different fuel types in Morocco.</a:t>
+            </a:r>
+          </a:p>
+          <a:p>
+            <a:pPr marL="285750" indent="-285750">
+              <a:spcAft>
+                <a:spcPts val="1200"/>
+              </a:spcAft>
+              <a:buFont typeface="Arial" panose="020B0604020202020204" pitchFamily="34" charset="0"/>
+              <a:buChar char="•"/>
+            </a:pPr>
+            <a:r>
+              <a:rPr lang="en-US" sz="1600" dirty="0"/>
+              <a:t>More broadly, the BED model is developed for researchers to explore the shifts of building energy demand at fine resolutions in response to environmental and socio-economic changes.</a:t>
+            </a:r>
+          </a:p>
+        </p:txBody>
+      </p:sp>
+      <p:pic>
+        <p:nvPicPr>
+          <p:cNvPr id="6" name="Picture 5">
+            <a:extLst>
+              <a:ext uri="{FF2B5EF4-FFF2-40B4-BE49-F238E27FC236}">
+                <a16:creationId xmlns:a16="http://schemas.microsoft.com/office/drawing/2014/main" id="{278B64D8-8767-3CF0-6B33-1FF3EC56A1B6}"/>
+              </a:ext>
+            </a:extLst>
+          </p:cNvPr>
+          <p:cNvPicPr>
+            <a:picLocks noChangeAspect="1"/>
+          </p:cNvPicPr>
+          <p:nvPr/>
+        </p:nvPicPr>
+        <p:blipFill>
+          <a:blip r:embed="rId2">
+            <a:extLst>
+              <a:ext uri="{28A0092B-C50C-407E-A947-70E740481C1C}">
+                <a14:useLocalDpi xmlns:a14="http://schemas.microsoft.com/office/drawing/2010/main" val="0"/>
+              </a:ext>
+            </a:extLst>
+          </a:blip>
+          <a:stretch>
+            <a:fillRect/>
+          </a:stretch>
+        </p:blipFill>
+        <p:spPr>
+          <a:xfrm>
+            <a:off x="6456422" y="1736291"/>
+            <a:ext cx="7844794" cy="5158286"/>
+          </a:xfrm>
+          <a:prstGeom prst="rect">
+            <a:avLst/>
+          </a:prstGeom>
+        </p:spPr>
+      </p:pic>
+      <p:sp>
+        <p:nvSpPr>
+          <p:cNvPr id="7" name="TextBox 6">
+            <a:extLst>
+              <a:ext uri="{FF2B5EF4-FFF2-40B4-BE49-F238E27FC236}">
+                <a16:creationId xmlns:a16="http://schemas.microsoft.com/office/drawing/2014/main" id="{859EEC50-56BE-22B3-2852-FA9823C350D5}"/>
+              </a:ext>
+            </a:extLst>
+          </p:cNvPr>
+          <p:cNvSpPr txBox="1"/>
+          <p:nvPr/>
+        </p:nvSpPr>
+        <p:spPr>
+          <a:xfrm>
+            <a:off x="9326880" y="694210"/>
+            <a:ext cx="4667416" cy="424732"/>
+          </a:xfrm>
+          <a:prstGeom prst="rect">
+            <a:avLst/>
+          </a:prstGeom>
+          <a:noFill/>
+        </p:spPr>
+        <p:txBody>
+          <a:bodyPr wrap="square">
+            <a:spAutoFit/>
+          </a:bodyPr>
+          <a:lstStyle/>
+          <a:p>
+            <a:r>
+              <a:rPr lang="en-US" dirty="0">
+                <a:hlinkClick r:id="rId3"/>
+              </a:rPr>
+              <a:t>https://github.com/JGCRI/bed</a:t>
+            </a:r>
+            <a:r>
+              <a:rPr lang="en-US" dirty="0"/>
+              <a:t> </a:t>
+            </a:r>
+          </a:p>
+        </p:txBody>
+      </p:sp>
+    </p:spTree>
+    <p:extLst>
+      <p:ext uri="{BB962C8B-B14F-4D97-AF65-F5344CB8AC3E}">
+        <p14:creationId xmlns:p14="http://schemas.microsoft.com/office/powerpoint/2010/main" val="1738068605"/>
+      </p:ext>
+    </p:extLst>
+  </p:cSld>
+  <p:clrMapOvr>
+    <a:masterClrMapping/>
+  </p:clrMapOvr>
+  <mc:AlternateContent xmlns:mc="http://schemas.openxmlformats.org/markup-compatibility/2006" xmlns:p14="http://schemas.microsoft.com/office/powerpoint/2010/main">
+    <mc:Choice Requires="p14">
+      <p:transition spd="med" p14:dur="700">
+        <p:fade/>
+      </p:transition>
+    </mc:Choice>
+    <mc:Fallback xmlns="">
+      <p:transition spd="med">
+        <p:fade/>
+      </p:transition>
+    </mc:Fallback>
+  </mc:AlternateContent>
+</p:sld>
+</file>
+
+<file path=ppt/slides/slide5.xml><?xml version="1.0" encoding="utf-8"?>
+<p:sld xmlns:a="http://schemas.openxmlformats.org/drawingml/2006/main" xmlns:r="http://schemas.openxmlformats.org/officeDocument/2006/relationships" xmlns:p="http://schemas.openxmlformats.org/presentationml/2006/main">
+  <p:cSld>
+    <p:spTree>
+      <p:nvGrpSpPr>
+        <p:cNvPr id="1" name=""/>
+        <p:cNvGrpSpPr/>
+        <p:nvPr/>
+      </p:nvGrpSpPr>
+      <p:grpSpPr>
+        <a:xfrm>
+          <a:off x="0" y="0"/>
+          <a:ext cx="0" cy="0"/>
+          <a:chOff x="0" y="0"/>
+          <a:chExt cx="0" cy="0"/>
+        </a:xfrm>
+      </p:grpSpPr>
+      <p:sp>
+        <p:nvSpPr>
+          <p:cNvPr id="2" name="Slide Number Placeholder 1">
+            <a:extLst>
+              <a:ext uri="{FF2B5EF4-FFF2-40B4-BE49-F238E27FC236}">
                 <a16:creationId xmlns:a16="http://schemas.microsoft.com/office/drawing/2014/main" id="{E4E339B0-829B-ED4A-EC77-C3D97474A822}"/>
               </a:ext>
             </a:extLst>
@@ -7791,7 +7961,7 @@
             <a:fld id="{FE7A4BB3-E848-5A44-82DF-322201952CD8}" type="slidenum">
               <a:rPr lang="en-US" smtClean="0"/>
               <a:pPr/>
-              <a:t>4</a:t>
+              <a:t>5</a:t>
             </a:fld>
             <a:endParaRPr lang="en-US"/>
           </a:p>
@@ -7840,7 +8010,7 @@
           <p:nvPr>
             <p:extLst>
               <p:ext uri="{D42A27DB-BD31-4B8C-83A1-F6EECF244321}">
-                <p14:modId xmlns:p14="http://schemas.microsoft.com/office/powerpoint/2010/main" val="823662507"/>
+                <p14:modId xmlns:p14="http://schemas.microsoft.com/office/powerpoint/2010/main" val="310753083"/>
               </p:ext>
             </p:extLst>
           </p:nvPr>
@@ -8122,7 +8292,15 @@
                       </a:pPr>
                       <a:r>
                         <a:rPr lang="en-US" sz="1600" dirty="0"/>
-                        <a:t>Get test data from NASA/ASU team</a:t>
+                        <a:t>Get test data from NASA/ASU team – </a:t>
+                      </a:r>
+                      <a:r>
+                        <a:rPr lang="en-US" sz="1600" dirty="0">
+                          <a:solidFill>
+                            <a:srgbClr val="FF0000"/>
+                          </a:solidFill>
+                        </a:rPr>
+                        <a:t>2m Air Temperature (Still needed)</a:t>
                       </a:r>
                     </a:p>
                   </a:txBody>
@@ -10507,7 +10685,7 @@
 </p:sld>
 </file>
 
-<file path=ppt/slides/slide5.xml><?xml version="1.0" encoding="utf-8"?>
+<file path=ppt/slides/slide6.xml><?xml version="1.0" encoding="utf-8"?>
 <p:sld xmlns:a="http://schemas.openxmlformats.org/drawingml/2006/main" xmlns:r="http://schemas.openxmlformats.org/officeDocument/2006/relationships" xmlns:p="http://schemas.openxmlformats.org/presentationml/2006/main">
   <p:cSld>
     <p:spTree>

</xml_diff>